<commit_message>
Update FT for CropOutPadding
</commit_message>
<xml_diff>
--- a/doc/test/CropOutPadding.pptx
+++ b/doc/test/CropOutPadding.pptx
@@ -245,7 +245,7 @@
           <a:p>
             <a:fld id="{26004F41-C1A1-4B0D-9EEE-5E3F0E5BC108}" type="datetimeFigureOut">
               <a:rPr lang="en-SG" smtClean="0"/>
-              <a:t>29/1/2017</a:t>
+              <a:t>14/3/2017</a:t>
             </a:fld>
             <a:endParaRPr lang="en-SG"/>
           </a:p>
@@ -860,7 +860,7 @@
           <a:p>
             <a:fld id="{699DC775-C286-4358-8C92-D7E584E969B3}" type="datetimeFigureOut">
               <a:rPr lang="en-US" smtClean="0"/>
-              <a:t>1/29/2017</a:t>
+              <a:t>3/14/2017</a:t>
             </a:fld>
             <a:endParaRPr lang="en-US"/>
           </a:p>
@@ -1028,7 +1028,7 @@
           <a:p>
             <a:fld id="{699DC775-C286-4358-8C92-D7E584E969B3}" type="datetimeFigureOut">
               <a:rPr lang="en-US" smtClean="0"/>
-              <a:t>1/29/2017</a:t>
+              <a:t>3/14/2017</a:t>
             </a:fld>
             <a:endParaRPr lang="en-US"/>
           </a:p>
@@ -1206,7 +1206,7 @@
           <a:p>
             <a:fld id="{699DC775-C286-4358-8C92-D7E584E969B3}" type="datetimeFigureOut">
               <a:rPr lang="en-US" smtClean="0"/>
-              <a:t>1/29/2017</a:t>
+              <a:t>3/14/2017</a:t>
             </a:fld>
             <a:endParaRPr lang="en-US"/>
           </a:p>
@@ -1446,7 +1446,7 @@
           <a:p>
             <a:fld id="{699DC775-C286-4358-8C92-D7E584E969B3}" type="datetimeFigureOut">
               <a:rPr lang="en-US" smtClean="0"/>
-              <a:t>1/29/2017</a:t>
+              <a:t>3/14/2017</a:t>
             </a:fld>
             <a:endParaRPr lang="en-US"/>
           </a:p>
@@ -1614,7 +1614,7 @@
           <a:p>
             <a:fld id="{699DC775-C286-4358-8C92-D7E584E969B3}" type="datetimeFigureOut">
               <a:rPr lang="en-US" smtClean="0"/>
-              <a:t>1/29/2017</a:t>
+              <a:t>3/14/2017</a:t>
             </a:fld>
             <a:endParaRPr lang="en-US"/>
           </a:p>
@@ -1859,7 +1859,7 @@
           <a:p>
             <a:fld id="{699DC775-C286-4358-8C92-D7E584E969B3}" type="datetimeFigureOut">
               <a:rPr lang="en-US" smtClean="0"/>
-              <a:t>1/29/2017</a:t>
+              <a:t>3/14/2017</a:t>
             </a:fld>
             <a:endParaRPr lang="en-US"/>
           </a:p>
@@ -2144,7 +2144,7 @@
           <a:p>
             <a:fld id="{699DC775-C286-4358-8C92-D7E584E969B3}" type="datetimeFigureOut">
               <a:rPr lang="en-US" smtClean="0"/>
-              <a:t>1/29/2017</a:t>
+              <a:t>3/14/2017</a:t>
             </a:fld>
             <a:endParaRPr lang="en-US"/>
           </a:p>
@@ -2563,7 +2563,7 @@
           <a:p>
             <a:fld id="{699DC775-C286-4358-8C92-D7E584E969B3}" type="datetimeFigureOut">
               <a:rPr lang="en-US" smtClean="0"/>
-              <a:t>1/29/2017</a:t>
+              <a:t>3/14/2017</a:t>
             </a:fld>
             <a:endParaRPr lang="en-US"/>
           </a:p>
@@ -2680,7 +2680,7 @@
           <a:p>
             <a:fld id="{699DC775-C286-4358-8C92-D7E584E969B3}" type="datetimeFigureOut">
               <a:rPr lang="en-US" smtClean="0"/>
-              <a:t>1/29/2017</a:t>
+              <a:t>3/14/2017</a:t>
             </a:fld>
             <a:endParaRPr lang="en-US"/>
           </a:p>
@@ -2775,7 +2775,7 @@
           <a:p>
             <a:fld id="{699DC775-C286-4358-8C92-D7E584E969B3}" type="datetimeFigureOut">
               <a:rPr lang="en-US" smtClean="0"/>
-              <a:t>1/29/2017</a:t>
+              <a:t>3/14/2017</a:t>
             </a:fld>
             <a:endParaRPr lang="en-US"/>
           </a:p>
@@ -3050,7 +3050,7 @@
           <a:p>
             <a:fld id="{699DC775-C286-4358-8C92-D7E584E969B3}" type="datetimeFigureOut">
               <a:rPr lang="en-US" smtClean="0"/>
-              <a:t>1/29/2017</a:t>
+              <a:t>3/14/2017</a:t>
             </a:fld>
             <a:endParaRPr lang="en-US"/>
           </a:p>
@@ -3218,7 +3218,7 @@
           <a:p>
             <a:fld id="{699DC775-C286-4358-8C92-D7E584E969B3}" type="datetimeFigureOut">
               <a:rPr lang="en-US" smtClean="0"/>
-              <a:t>1/29/2017</a:t>
+              <a:t>3/14/2017</a:t>
             </a:fld>
             <a:endParaRPr lang="en-US"/>
           </a:p>
@@ -3470,7 +3470,7 @@
           <a:p>
             <a:fld id="{699DC775-C286-4358-8C92-D7E584E969B3}" type="datetimeFigureOut">
               <a:rPr lang="en-US" smtClean="0"/>
-              <a:t>1/29/2017</a:t>
+              <a:t>3/14/2017</a:t>
             </a:fld>
             <a:endParaRPr lang="en-US"/>
           </a:p>
@@ -3638,7 +3638,7 @@
           <a:p>
             <a:fld id="{699DC775-C286-4358-8C92-D7E584E969B3}" type="datetimeFigureOut">
               <a:rPr lang="en-US" smtClean="0"/>
-              <a:t>1/29/2017</a:t>
+              <a:t>3/14/2017</a:t>
             </a:fld>
             <a:endParaRPr lang="en-US"/>
           </a:p>
@@ -3816,7 +3816,7 @@
           <a:p>
             <a:fld id="{699DC775-C286-4358-8C92-D7E584E969B3}" type="datetimeFigureOut">
               <a:rPr lang="en-US" smtClean="0"/>
-              <a:t>1/29/2017</a:t>
+              <a:t>3/14/2017</a:t>
             </a:fld>
             <a:endParaRPr lang="en-US"/>
           </a:p>
@@ -4064,7 +4064,7 @@
           <a:p>
             <a:fld id="{699DC775-C286-4358-8C92-D7E584E969B3}" type="datetimeFigureOut">
               <a:rPr lang="en-US" smtClean="0"/>
-              <a:t>1/29/2017</a:t>
+              <a:t>3/14/2017</a:t>
             </a:fld>
             <a:endParaRPr lang="en-US"/>
           </a:p>
@@ -4240,7 +4240,7 @@
           <a:p>
             <a:fld id="{699DC775-C286-4358-8C92-D7E584E969B3}" type="datetimeFigureOut">
               <a:rPr lang="en-US" smtClean="0"/>
-              <a:t>1/29/2017</a:t>
+              <a:t>3/14/2017</a:t>
             </a:fld>
             <a:endParaRPr lang="en-US"/>
           </a:p>
@@ -4493,7 +4493,7 @@
           <a:p>
             <a:fld id="{699DC775-C286-4358-8C92-D7E584E969B3}" type="datetimeFigureOut">
               <a:rPr lang="en-US" smtClean="0"/>
-              <a:t>1/29/2017</a:t>
+              <a:t>3/14/2017</a:t>
             </a:fld>
             <a:endParaRPr lang="en-US"/>
           </a:p>
@@ -4786,7 +4786,7 @@
           <a:p>
             <a:fld id="{699DC775-C286-4358-8C92-D7E584E969B3}" type="datetimeFigureOut">
               <a:rPr lang="en-US" smtClean="0"/>
-              <a:t>1/29/2017</a:t>
+              <a:t>3/14/2017</a:t>
             </a:fld>
             <a:endParaRPr lang="en-US"/>
           </a:p>
@@ -5213,7 +5213,7 @@
           <a:p>
             <a:fld id="{699DC775-C286-4358-8C92-D7E584E969B3}" type="datetimeFigureOut">
               <a:rPr lang="en-US" smtClean="0"/>
-              <a:t>1/29/2017</a:t>
+              <a:t>3/14/2017</a:t>
             </a:fld>
             <a:endParaRPr lang="en-US"/>
           </a:p>
@@ -5338,7 +5338,7 @@
           <a:p>
             <a:fld id="{699DC775-C286-4358-8C92-D7E584E969B3}" type="datetimeFigureOut">
               <a:rPr lang="en-US" smtClean="0"/>
-              <a:t>1/29/2017</a:t>
+              <a:t>3/14/2017</a:t>
             </a:fld>
             <a:endParaRPr lang="en-US"/>
           </a:p>
@@ -5441,7 +5441,7 @@
           <a:p>
             <a:fld id="{699DC775-C286-4358-8C92-D7E584E969B3}" type="datetimeFigureOut">
               <a:rPr lang="en-US" smtClean="0"/>
-              <a:t>1/29/2017</a:t>
+              <a:t>3/14/2017</a:t>
             </a:fld>
             <a:endParaRPr lang="en-US"/>
           </a:p>
@@ -5686,7 +5686,7 @@
           <a:p>
             <a:fld id="{699DC775-C286-4358-8C92-D7E584E969B3}" type="datetimeFigureOut">
               <a:rPr lang="en-US" smtClean="0"/>
-              <a:t>1/29/2017</a:t>
+              <a:t>3/14/2017</a:t>
             </a:fld>
             <a:endParaRPr lang="en-US"/>
           </a:p>
@@ -5969,7 +5969,7 @@
           <a:p>
             <a:fld id="{699DC775-C286-4358-8C92-D7E584E969B3}" type="datetimeFigureOut">
               <a:rPr lang="en-US" smtClean="0"/>
-              <a:t>1/29/2017</a:t>
+              <a:t>3/14/2017</a:t>
             </a:fld>
             <a:endParaRPr lang="en-US"/>
           </a:p>
@@ -6229,7 +6229,7 @@
           <a:p>
             <a:fld id="{699DC775-C286-4358-8C92-D7E584E969B3}" type="datetimeFigureOut">
               <a:rPr lang="en-US" smtClean="0"/>
-              <a:t>1/29/2017</a:t>
+              <a:t>3/14/2017</a:t>
             </a:fld>
             <a:endParaRPr lang="en-US"/>
           </a:p>
@@ -6405,7 +6405,7 @@
           <a:p>
             <a:fld id="{699DC775-C286-4358-8C92-D7E584E969B3}" type="datetimeFigureOut">
               <a:rPr lang="en-US" smtClean="0"/>
-              <a:t>1/29/2017</a:t>
+              <a:t>3/14/2017</a:t>
             </a:fld>
             <a:endParaRPr lang="en-US"/>
           </a:p>
@@ -6591,7 +6591,7 @@
           <a:p>
             <a:fld id="{699DC775-C286-4358-8C92-D7E584E969B3}" type="datetimeFigureOut">
               <a:rPr lang="en-US" smtClean="0"/>
-              <a:t>1/29/2017</a:t>
+              <a:t>3/14/2017</a:t>
             </a:fld>
             <a:endParaRPr lang="en-US"/>
           </a:p>
@@ -6876,7 +6876,7 @@
           <a:p>
             <a:fld id="{699DC775-C286-4358-8C92-D7E584E969B3}" type="datetimeFigureOut">
               <a:rPr lang="en-US" smtClean="0"/>
-              <a:t>1/29/2017</a:t>
+              <a:t>3/14/2017</a:t>
             </a:fld>
             <a:endParaRPr lang="en-US"/>
           </a:p>
@@ -7295,7 +7295,7 @@
           <a:p>
             <a:fld id="{699DC775-C286-4358-8C92-D7E584E969B3}" type="datetimeFigureOut">
               <a:rPr lang="en-US" smtClean="0"/>
-              <a:t>1/29/2017</a:t>
+              <a:t>3/14/2017</a:t>
             </a:fld>
             <a:endParaRPr lang="en-US"/>
           </a:p>
@@ -7412,7 +7412,7 @@
           <a:p>
             <a:fld id="{699DC775-C286-4358-8C92-D7E584E969B3}" type="datetimeFigureOut">
               <a:rPr lang="en-US" smtClean="0"/>
-              <a:t>1/29/2017</a:t>
+              <a:t>3/14/2017</a:t>
             </a:fld>
             <a:endParaRPr lang="en-US"/>
           </a:p>
@@ -7507,7 +7507,7 @@
           <a:p>
             <a:fld id="{699DC775-C286-4358-8C92-D7E584E969B3}" type="datetimeFigureOut">
               <a:rPr lang="en-US" smtClean="0"/>
-              <a:t>1/29/2017</a:t>
+              <a:t>3/14/2017</a:t>
             </a:fld>
             <a:endParaRPr lang="en-US"/>
           </a:p>
@@ -7782,7 +7782,7 @@
           <a:p>
             <a:fld id="{699DC775-C286-4358-8C92-D7E584E969B3}" type="datetimeFigureOut">
               <a:rPr lang="en-US" smtClean="0"/>
-              <a:t>1/29/2017</a:t>
+              <a:t>3/14/2017</a:t>
             </a:fld>
             <a:endParaRPr lang="en-US"/>
           </a:p>
@@ -8034,7 +8034,7 @@
           <a:p>
             <a:fld id="{699DC775-C286-4358-8C92-D7E584E969B3}" type="datetimeFigureOut">
               <a:rPr lang="en-US" smtClean="0"/>
-              <a:t>1/29/2017</a:t>
+              <a:t>3/14/2017</a:t>
             </a:fld>
             <a:endParaRPr lang="en-US"/>
           </a:p>
@@ -8245,7 +8245,7 @@
           <a:p>
             <a:fld id="{699DC775-C286-4358-8C92-D7E584E969B3}" type="datetimeFigureOut">
               <a:rPr lang="en-US" smtClean="0"/>
-              <a:t>1/29/2017</a:t>
+              <a:t>3/14/2017</a:t>
             </a:fld>
             <a:endParaRPr lang="en-US"/>
           </a:p>
@@ -8758,7 +8758,7 @@
           <a:p>
             <a:fld id="{699DC775-C286-4358-8C92-D7E584E969B3}" type="datetimeFigureOut">
               <a:rPr lang="en-US" smtClean="0"/>
-              <a:t>1/29/2017</a:t>
+              <a:t>3/14/2017</a:t>
             </a:fld>
             <a:endParaRPr lang="en-US"/>
           </a:p>
@@ -9269,7 +9269,7 @@
           <a:p>
             <a:fld id="{699DC775-C286-4358-8C92-D7E584E969B3}" type="datetimeFigureOut">
               <a:rPr lang="en-US" smtClean="0"/>
-              <a:t>1/29/2017</a:t>
+              <a:t>3/14/2017</a:t>
             </a:fld>
             <a:endParaRPr lang="en-US"/>
           </a:p>
@@ -9848,9 +9848,47 @@
           <a:chExt cx="0" cy="0"/>
         </a:xfrm>
       </p:grpSpPr>
+      <p:sp>
+        <p:nvSpPr>
+          <p:cNvPr id="4" name="text 3"/>
+          <p:cNvSpPr txBox="1"/>
+          <p:nvPr/>
+        </p:nvSpPr>
+        <p:spPr>
+          <a:xfrm>
+            <a:off x="3365631" y="6019800"/>
+            <a:ext cx="2693814" cy="523220"/>
+          </a:xfrm>
+          <a:prstGeom prst="rect">
+            <a:avLst/>
+          </a:prstGeom>
+          <a:noFill/>
+        </p:spPr>
+        <p:txBody>
+          <a:bodyPr wrap="none" rtlCol="0">
+            <a:spAutoFit/>
+          </a:bodyPr>
+          <a:lstStyle/>
+          <a:p>
+            <a:r>
+              <a:rPr lang="en-US" sz="2800" b="1" dirty="0">
+                <a:solidFill>
+                  <a:schemeClr val="accent1"/>
+                </a:solidFill>
+              </a:rPr>
+              <a:t>Expected Output</a:t>
+            </a:r>
+            <a:endParaRPr lang="en-SG" sz="2800" b="1" dirty="0">
+              <a:solidFill>
+                <a:schemeClr val="accent1"/>
+              </a:solidFill>
+            </a:endParaRPr>
+          </a:p>
+        </p:txBody>
+      </p:sp>
       <p:pic>
         <p:nvPicPr>
-          <p:cNvPr id="7" name="selectMe"/>
+          <p:cNvPr id="5" name="selectMe"/>
           <p:cNvPicPr>
             <a:picLocks noChangeAspect="1"/>
           </p:cNvPicPr>
@@ -9864,59 +9902,21 @@
               </a:ext>
             </a:extLst>
           </a:blip>
-          <a:srcRect l="26727" t="26727" r="27778" b="26877"/>
+          <a:srcRect l="26727" t="26727" r="27628" b="26727"/>
           <a:stretch>
             <a:fillRect/>
           </a:stretch>
         </p:blipFill>
         <p:spPr>
           <a:xfrm rot="18884896">
-            <a:off x="3100821" y="1976443"/>
-            <a:ext cx="2888598" cy="2945798"/>
+            <a:off x="3102796" y="1971647"/>
+            <a:ext cx="2898131" cy="2955332"/>
           </a:xfrm>
           <a:prstGeom prst="rect">
             <a:avLst/>
           </a:prstGeom>
         </p:spPr>
       </p:pic>
-      <p:sp>
-        <p:nvSpPr>
-          <p:cNvPr id="4" name="text 3"/>
-          <p:cNvSpPr txBox="1"/>
-          <p:nvPr/>
-        </p:nvSpPr>
-        <p:spPr>
-          <a:xfrm>
-            <a:off x="3365631" y="6019800"/>
-            <a:ext cx="2693814" cy="523220"/>
-          </a:xfrm>
-          <a:prstGeom prst="rect">
-            <a:avLst/>
-          </a:prstGeom>
-          <a:noFill/>
-        </p:spPr>
-        <p:txBody>
-          <a:bodyPr wrap="none" rtlCol="0">
-            <a:spAutoFit/>
-          </a:bodyPr>
-          <a:lstStyle/>
-          <a:p>
-            <a:r>
-              <a:rPr lang="en-US" sz="2800" b="1" dirty="0">
-                <a:solidFill>
-                  <a:schemeClr val="accent1"/>
-                </a:solidFill>
-              </a:rPr>
-              <a:t>Expected Output</a:t>
-            </a:r>
-            <a:endParaRPr lang="en-SG" sz="2800" b="1" dirty="0">
-              <a:solidFill>
-                <a:schemeClr val="accent1"/>
-              </a:solidFill>
-            </a:endParaRPr>
-          </a:p>
-        </p:txBody>
-      </p:sp>
     </p:spTree>
     <p:extLst>
       <p:ext uri="{BB962C8B-B14F-4D97-AF65-F5344CB8AC3E}">
@@ -10375,9 +10375,47 @@
           <a:chExt cx="0" cy="0"/>
         </a:xfrm>
       </p:grpSpPr>
+      <p:sp>
+        <p:nvSpPr>
+          <p:cNvPr id="4" name="text 3"/>
+          <p:cNvSpPr txBox="1"/>
+          <p:nvPr/>
+        </p:nvSpPr>
+        <p:spPr>
+          <a:xfrm>
+            <a:off x="3365631" y="6019800"/>
+            <a:ext cx="2693814" cy="523220"/>
+          </a:xfrm>
+          <a:prstGeom prst="rect">
+            <a:avLst/>
+          </a:prstGeom>
+          <a:noFill/>
+        </p:spPr>
+        <p:txBody>
+          <a:bodyPr wrap="none" rtlCol="0">
+            <a:spAutoFit/>
+          </a:bodyPr>
+          <a:lstStyle/>
+          <a:p>
+            <a:r>
+              <a:rPr lang="en-US" sz="2800" b="1" dirty="0">
+                <a:solidFill>
+                  <a:schemeClr val="accent1"/>
+                </a:solidFill>
+              </a:rPr>
+              <a:t>Expected Output</a:t>
+            </a:r>
+            <a:endParaRPr lang="en-SG" sz="2800" b="1" dirty="0">
+              <a:solidFill>
+                <a:schemeClr val="accent1"/>
+              </a:solidFill>
+            </a:endParaRPr>
+          </a:p>
+        </p:txBody>
+      </p:sp>
       <p:pic>
         <p:nvPicPr>
-          <p:cNvPr id="5" name="selectMe"/>
+          <p:cNvPr id="7" name="selectMe"/>
           <p:cNvPicPr>
             <a:picLocks noChangeAspect="1"/>
           </p:cNvPicPr>
@@ -10391,7 +10429,7 @@
               </a:ext>
             </a:extLst>
           </a:blip>
-          <a:srcRect l="26727" t="26727" r="27778" b="26877"/>
+          <a:srcRect l="26727" t="26727" r="27628" b="26727"/>
           <a:stretch>
             <a:fillRect/>
           </a:stretch>
@@ -10399,51 +10437,13 @@
         <p:spPr>
           <a:xfrm>
             <a:off x="3094331" y="1951331"/>
-            <a:ext cx="2888598" cy="2945798"/>
+            <a:ext cx="2898131" cy="2955332"/>
           </a:xfrm>
           <a:prstGeom prst="rect">
             <a:avLst/>
           </a:prstGeom>
         </p:spPr>
       </p:pic>
-      <p:sp>
-        <p:nvSpPr>
-          <p:cNvPr id="4" name="text 3"/>
-          <p:cNvSpPr txBox="1"/>
-          <p:nvPr/>
-        </p:nvSpPr>
-        <p:spPr>
-          <a:xfrm>
-            <a:off x="3365631" y="6019800"/>
-            <a:ext cx="2693814" cy="523220"/>
-          </a:xfrm>
-          <a:prstGeom prst="rect">
-            <a:avLst/>
-          </a:prstGeom>
-          <a:noFill/>
-        </p:spPr>
-        <p:txBody>
-          <a:bodyPr wrap="none" rtlCol="0">
-            <a:spAutoFit/>
-          </a:bodyPr>
-          <a:lstStyle/>
-          <a:p>
-            <a:r>
-              <a:rPr lang="en-US" sz="2800" b="1" dirty="0">
-                <a:solidFill>
-                  <a:schemeClr val="accent1"/>
-                </a:solidFill>
-              </a:rPr>
-              <a:t>Expected Output</a:t>
-            </a:r>
-            <a:endParaRPr lang="en-SG" sz="2800" b="1" dirty="0">
-              <a:solidFill>
-                <a:schemeClr val="accent1"/>
-              </a:solidFill>
-            </a:endParaRPr>
-          </a:p>
-        </p:txBody>
-      </p:sp>
     </p:spTree>
     <p:extLst>
       <p:ext uri="{BB962C8B-B14F-4D97-AF65-F5344CB8AC3E}">
@@ -10671,9 +10671,47 @@
           <a:chExt cx="0" cy="0"/>
         </a:xfrm>
       </p:grpSpPr>
+      <p:sp>
+        <p:nvSpPr>
+          <p:cNvPr id="6" name="text 3"/>
+          <p:cNvSpPr txBox="1"/>
+          <p:nvPr/>
+        </p:nvSpPr>
+        <p:spPr>
+          <a:xfrm>
+            <a:off x="3365631" y="6019800"/>
+            <a:ext cx="2693814" cy="523220"/>
+          </a:xfrm>
+          <a:prstGeom prst="rect">
+            <a:avLst/>
+          </a:prstGeom>
+          <a:noFill/>
+        </p:spPr>
+        <p:txBody>
+          <a:bodyPr wrap="none" rtlCol="0">
+            <a:spAutoFit/>
+          </a:bodyPr>
+          <a:lstStyle/>
+          <a:p>
+            <a:r>
+              <a:rPr lang="en-US" sz="2800" b="1" dirty="0">
+                <a:solidFill>
+                  <a:schemeClr val="accent1"/>
+                </a:solidFill>
+              </a:rPr>
+              <a:t>Expected Output</a:t>
+            </a:r>
+            <a:endParaRPr lang="en-SG" sz="2800" b="1" dirty="0">
+              <a:solidFill>
+                <a:schemeClr val="accent1"/>
+              </a:solidFill>
+            </a:endParaRPr>
+          </a:p>
+        </p:txBody>
+      </p:sp>
       <p:pic>
         <p:nvPicPr>
-          <p:cNvPr id="13" name="selectMe2"/>
+          <p:cNvPr id="5" name="selectMe2"/>
           <p:cNvPicPr>
             <a:picLocks noChangeAspect="1"/>
           </p:cNvPicPr>
@@ -10687,7 +10725,7 @@
               </a:ext>
             </a:extLst>
           </a:blip>
-          <a:srcRect l="26687" t="26727" r="27886" b="26877"/>
+          <a:srcRect l="26687" t="26727" r="27736" b="26727"/>
           <a:stretch>
             <a:fillRect/>
           </a:stretch>
@@ -10695,7 +10733,7 @@
         <p:spPr>
           <a:xfrm>
             <a:off x="1389590" y="2018236"/>
-            <a:ext cx="2884265" cy="2945798"/>
+            <a:ext cx="2893784" cy="2955332"/>
           </a:xfrm>
           <a:prstGeom prst="rect">
             <a:avLst/>
@@ -10704,7 +10742,7 @@
       </p:pic>
       <p:pic>
         <p:nvPicPr>
-          <p:cNvPr id="14" name="selectMe1"/>
+          <p:cNvPr id="7" name="selectMe1"/>
           <p:cNvPicPr>
             <a:picLocks noChangeAspect="1"/>
           </p:cNvPicPr>
@@ -10718,7 +10756,7 @@
               </a:ext>
             </a:extLst>
           </a:blip>
-          <a:srcRect l="26687" t="26687" r="27886" b="26837"/>
+          <a:srcRect l="26687" t="26687" r="27736" b="26687"/>
           <a:stretch>
             <a:fillRect/>
           </a:stretch>
@@ -10726,51 +10764,13 @@
         <p:spPr>
           <a:xfrm>
             <a:off x="5047190" y="1999190"/>
-            <a:ext cx="2884265" cy="2950898"/>
+            <a:ext cx="2893784" cy="2960418"/>
           </a:xfrm>
           <a:prstGeom prst="rect">
             <a:avLst/>
           </a:prstGeom>
         </p:spPr>
       </p:pic>
-      <p:sp>
-        <p:nvSpPr>
-          <p:cNvPr id="6" name="text 3"/>
-          <p:cNvSpPr txBox="1"/>
-          <p:nvPr/>
-        </p:nvSpPr>
-        <p:spPr>
-          <a:xfrm>
-            <a:off x="3365631" y="6019800"/>
-            <a:ext cx="2693814" cy="523220"/>
-          </a:xfrm>
-          <a:prstGeom prst="rect">
-            <a:avLst/>
-          </a:prstGeom>
-          <a:noFill/>
-        </p:spPr>
-        <p:txBody>
-          <a:bodyPr wrap="none" rtlCol="0">
-            <a:spAutoFit/>
-          </a:bodyPr>
-          <a:lstStyle/>
-          <a:p>
-            <a:r>
-              <a:rPr lang="en-US" sz="2800" b="1" dirty="0">
-                <a:solidFill>
-                  <a:schemeClr val="accent1"/>
-                </a:solidFill>
-              </a:rPr>
-              <a:t>Expected Output</a:t>
-            </a:r>
-            <a:endParaRPr lang="en-SG" sz="2800" b="1" dirty="0">
-              <a:solidFill>
-                <a:schemeClr val="accent1"/>
-              </a:solidFill>
-            </a:endParaRPr>
-          </a:p>
-        </p:txBody>
-      </p:sp>
     </p:spTree>
     <p:extLst>
       <p:ext uri="{BB962C8B-B14F-4D97-AF65-F5344CB8AC3E}">

</xml_diff>

<commit_message>
Fix tests that broke due to addition of z order check
</commit_message>
<xml_diff>
--- a/doc/test/CropOutPadding.pptx
+++ b/doc/test/CropOutPadding.pptx
@@ -14,13 +14,13 @@
     <p:sldId id="256" r:id="rId5"/>
     <p:sldId id="292" r:id="rId6"/>
     <p:sldId id="293" r:id="rId7"/>
-    <p:sldId id="308" r:id="rId8"/>
+    <p:sldId id="312" r:id="rId8"/>
     <p:sldId id="296" r:id="rId9"/>
     <p:sldId id="301" r:id="rId10"/>
-    <p:sldId id="309" r:id="rId11"/>
+    <p:sldId id="311" r:id="rId11"/>
     <p:sldId id="305" r:id="rId12"/>
     <p:sldId id="306" r:id="rId13"/>
-    <p:sldId id="310" r:id="rId14"/>
+    <p:sldId id="313" r:id="rId14"/>
     <p:sldId id="274" r:id="rId15"/>
   </p:sldIdLst>
   <p:sldSz cx="9144000" cy="6858000" type="screen4x3"/>
@@ -133,13 +133,13 @@
             <p14:sldId id="256"/>
             <p14:sldId id="292"/>
             <p14:sldId id="293"/>
-            <p14:sldId id="308"/>
+            <p14:sldId id="312"/>
             <p14:sldId id="296"/>
             <p14:sldId id="301"/>
-            <p14:sldId id="309"/>
+            <p14:sldId id="311"/>
             <p14:sldId id="305"/>
             <p14:sldId id="306"/>
-            <p14:sldId id="310"/>
+            <p14:sldId id="313"/>
             <p14:sldId id="274"/>
           </p14:sldIdLst>
         </p14:section>
@@ -245,7 +245,7 @@
           <a:p>
             <a:fld id="{26004F41-C1A1-4B0D-9EEE-5E3F0E5BC108}" type="datetimeFigureOut">
               <a:rPr lang="en-SG" smtClean="0"/>
-              <a:t>14/3/2017</a:t>
+              <a:t>11/5/2017</a:t>
             </a:fld>
             <a:endParaRPr lang="en-SG"/>
           </a:p>
@@ -671,7 +671,7 @@
     </p:spTree>
     <p:extLst>
       <p:ext uri="{BB962C8B-B14F-4D97-AF65-F5344CB8AC3E}">
-        <p14:creationId xmlns:p14="http://schemas.microsoft.com/office/powerpoint/2010/main" val="880112976"/>
+        <p14:creationId xmlns:p14="http://schemas.microsoft.com/office/powerpoint/2010/main" val="1425387705"/>
       </p:ext>
     </p:extLst>
   </p:cSld>
@@ -860,7 +860,7 @@
           <a:p>
             <a:fld id="{699DC775-C286-4358-8C92-D7E584E969B3}" type="datetimeFigureOut">
               <a:rPr lang="en-US" smtClean="0"/>
-              <a:t>3/14/2017</a:t>
+              <a:t>5/11/2017</a:t>
             </a:fld>
             <a:endParaRPr lang="en-US"/>
           </a:p>
@@ -1028,7 +1028,7 @@
           <a:p>
             <a:fld id="{699DC775-C286-4358-8C92-D7E584E969B3}" type="datetimeFigureOut">
               <a:rPr lang="en-US" smtClean="0"/>
-              <a:t>3/14/2017</a:t>
+              <a:t>5/11/2017</a:t>
             </a:fld>
             <a:endParaRPr lang="en-US"/>
           </a:p>
@@ -1206,7 +1206,7 @@
           <a:p>
             <a:fld id="{699DC775-C286-4358-8C92-D7E584E969B3}" type="datetimeFigureOut">
               <a:rPr lang="en-US" smtClean="0"/>
-              <a:t>3/14/2017</a:t>
+              <a:t>5/11/2017</a:t>
             </a:fld>
             <a:endParaRPr lang="en-US"/>
           </a:p>
@@ -1446,7 +1446,7 @@
           <a:p>
             <a:fld id="{699DC775-C286-4358-8C92-D7E584E969B3}" type="datetimeFigureOut">
               <a:rPr lang="en-US" smtClean="0"/>
-              <a:t>3/14/2017</a:t>
+              <a:t>5/11/2017</a:t>
             </a:fld>
             <a:endParaRPr lang="en-US"/>
           </a:p>
@@ -1614,7 +1614,7 @@
           <a:p>
             <a:fld id="{699DC775-C286-4358-8C92-D7E584E969B3}" type="datetimeFigureOut">
               <a:rPr lang="en-US" smtClean="0"/>
-              <a:t>3/14/2017</a:t>
+              <a:t>5/11/2017</a:t>
             </a:fld>
             <a:endParaRPr lang="en-US"/>
           </a:p>
@@ -1859,7 +1859,7 @@
           <a:p>
             <a:fld id="{699DC775-C286-4358-8C92-D7E584E969B3}" type="datetimeFigureOut">
               <a:rPr lang="en-US" smtClean="0"/>
-              <a:t>3/14/2017</a:t>
+              <a:t>5/11/2017</a:t>
             </a:fld>
             <a:endParaRPr lang="en-US"/>
           </a:p>
@@ -2144,7 +2144,7 @@
           <a:p>
             <a:fld id="{699DC775-C286-4358-8C92-D7E584E969B3}" type="datetimeFigureOut">
               <a:rPr lang="en-US" smtClean="0"/>
-              <a:t>3/14/2017</a:t>
+              <a:t>5/11/2017</a:t>
             </a:fld>
             <a:endParaRPr lang="en-US"/>
           </a:p>
@@ -2563,7 +2563,7 @@
           <a:p>
             <a:fld id="{699DC775-C286-4358-8C92-D7E584E969B3}" type="datetimeFigureOut">
               <a:rPr lang="en-US" smtClean="0"/>
-              <a:t>3/14/2017</a:t>
+              <a:t>5/11/2017</a:t>
             </a:fld>
             <a:endParaRPr lang="en-US"/>
           </a:p>
@@ -2680,7 +2680,7 @@
           <a:p>
             <a:fld id="{699DC775-C286-4358-8C92-D7E584E969B3}" type="datetimeFigureOut">
               <a:rPr lang="en-US" smtClean="0"/>
-              <a:t>3/14/2017</a:t>
+              <a:t>5/11/2017</a:t>
             </a:fld>
             <a:endParaRPr lang="en-US"/>
           </a:p>
@@ -2775,7 +2775,7 @@
           <a:p>
             <a:fld id="{699DC775-C286-4358-8C92-D7E584E969B3}" type="datetimeFigureOut">
               <a:rPr lang="en-US" smtClean="0"/>
-              <a:t>3/14/2017</a:t>
+              <a:t>5/11/2017</a:t>
             </a:fld>
             <a:endParaRPr lang="en-US"/>
           </a:p>
@@ -3050,7 +3050,7 @@
           <a:p>
             <a:fld id="{699DC775-C286-4358-8C92-D7E584E969B3}" type="datetimeFigureOut">
               <a:rPr lang="en-US" smtClean="0"/>
-              <a:t>3/14/2017</a:t>
+              <a:t>5/11/2017</a:t>
             </a:fld>
             <a:endParaRPr lang="en-US"/>
           </a:p>
@@ -3218,7 +3218,7 @@
           <a:p>
             <a:fld id="{699DC775-C286-4358-8C92-D7E584E969B3}" type="datetimeFigureOut">
               <a:rPr lang="en-US" smtClean="0"/>
-              <a:t>3/14/2017</a:t>
+              <a:t>5/11/2017</a:t>
             </a:fld>
             <a:endParaRPr lang="en-US"/>
           </a:p>
@@ -3470,7 +3470,7 @@
           <a:p>
             <a:fld id="{699DC775-C286-4358-8C92-D7E584E969B3}" type="datetimeFigureOut">
               <a:rPr lang="en-US" smtClean="0"/>
-              <a:t>3/14/2017</a:t>
+              <a:t>5/11/2017</a:t>
             </a:fld>
             <a:endParaRPr lang="en-US"/>
           </a:p>
@@ -3638,7 +3638,7 @@
           <a:p>
             <a:fld id="{699DC775-C286-4358-8C92-D7E584E969B3}" type="datetimeFigureOut">
               <a:rPr lang="en-US" smtClean="0"/>
-              <a:t>3/14/2017</a:t>
+              <a:t>5/11/2017</a:t>
             </a:fld>
             <a:endParaRPr lang="en-US"/>
           </a:p>
@@ -3816,7 +3816,7 @@
           <a:p>
             <a:fld id="{699DC775-C286-4358-8C92-D7E584E969B3}" type="datetimeFigureOut">
               <a:rPr lang="en-US" smtClean="0"/>
-              <a:t>3/14/2017</a:t>
+              <a:t>5/11/2017</a:t>
             </a:fld>
             <a:endParaRPr lang="en-US"/>
           </a:p>
@@ -4064,7 +4064,7 @@
           <a:p>
             <a:fld id="{699DC775-C286-4358-8C92-D7E584E969B3}" type="datetimeFigureOut">
               <a:rPr lang="en-US" smtClean="0"/>
-              <a:t>3/14/2017</a:t>
+              <a:t>5/11/2017</a:t>
             </a:fld>
             <a:endParaRPr lang="en-US"/>
           </a:p>
@@ -4240,7 +4240,7 @@
           <a:p>
             <a:fld id="{699DC775-C286-4358-8C92-D7E584E969B3}" type="datetimeFigureOut">
               <a:rPr lang="en-US" smtClean="0"/>
-              <a:t>3/14/2017</a:t>
+              <a:t>5/11/2017</a:t>
             </a:fld>
             <a:endParaRPr lang="en-US"/>
           </a:p>
@@ -4493,7 +4493,7 @@
           <a:p>
             <a:fld id="{699DC775-C286-4358-8C92-D7E584E969B3}" type="datetimeFigureOut">
               <a:rPr lang="en-US" smtClean="0"/>
-              <a:t>3/14/2017</a:t>
+              <a:t>5/11/2017</a:t>
             </a:fld>
             <a:endParaRPr lang="en-US"/>
           </a:p>
@@ -4786,7 +4786,7 @@
           <a:p>
             <a:fld id="{699DC775-C286-4358-8C92-D7E584E969B3}" type="datetimeFigureOut">
               <a:rPr lang="en-US" smtClean="0"/>
-              <a:t>3/14/2017</a:t>
+              <a:t>5/11/2017</a:t>
             </a:fld>
             <a:endParaRPr lang="en-US"/>
           </a:p>
@@ -5213,7 +5213,7 @@
           <a:p>
             <a:fld id="{699DC775-C286-4358-8C92-D7E584E969B3}" type="datetimeFigureOut">
               <a:rPr lang="en-US" smtClean="0"/>
-              <a:t>3/14/2017</a:t>
+              <a:t>5/11/2017</a:t>
             </a:fld>
             <a:endParaRPr lang="en-US"/>
           </a:p>
@@ -5338,7 +5338,7 @@
           <a:p>
             <a:fld id="{699DC775-C286-4358-8C92-D7E584E969B3}" type="datetimeFigureOut">
               <a:rPr lang="en-US" smtClean="0"/>
-              <a:t>3/14/2017</a:t>
+              <a:t>5/11/2017</a:t>
             </a:fld>
             <a:endParaRPr lang="en-US"/>
           </a:p>
@@ -5441,7 +5441,7 @@
           <a:p>
             <a:fld id="{699DC775-C286-4358-8C92-D7E584E969B3}" type="datetimeFigureOut">
               <a:rPr lang="en-US" smtClean="0"/>
-              <a:t>3/14/2017</a:t>
+              <a:t>5/11/2017</a:t>
             </a:fld>
             <a:endParaRPr lang="en-US"/>
           </a:p>
@@ -5686,7 +5686,7 @@
           <a:p>
             <a:fld id="{699DC775-C286-4358-8C92-D7E584E969B3}" type="datetimeFigureOut">
               <a:rPr lang="en-US" smtClean="0"/>
-              <a:t>3/14/2017</a:t>
+              <a:t>5/11/2017</a:t>
             </a:fld>
             <a:endParaRPr lang="en-US"/>
           </a:p>
@@ -5969,7 +5969,7 @@
           <a:p>
             <a:fld id="{699DC775-C286-4358-8C92-D7E584E969B3}" type="datetimeFigureOut">
               <a:rPr lang="en-US" smtClean="0"/>
-              <a:t>3/14/2017</a:t>
+              <a:t>5/11/2017</a:t>
             </a:fld>
             <a:endParaRPr lang="en-US"/>
           </a:p>
@@ -6229,7 +6229,7 @@
           <a:p>
             <a:fld id="{699DC775-C286-4358-8C92-D7E584E969B3}" type="datetimeFigureOut">
               <a:rPr lang="en-US" smtClean="0"/>
-              <a:t>3/14/2017</a:t>
+              <a:t>5/11/2017</a:t>
             </a:fld>
             <a:endParaRPr lang="en-US"/>
           </a:p>
@@ -6405,7 +6405,7 @@
           <a:p>
             <a:fld id="{699DC775-C286-4358-8C92-D7E584E969B3}" type="datetimeFigureOut">
               <a:rPr lang="en-US" smtClean="0"/>
-              <a:t>3/14/2017</a:t>
+              <a:t>5/11/2017</a:t>
             </a:fld>
             <a:endParaRPr lang="en-US"/>
           </a:p>
@@ -6591,7 +6591,7 @@
           <a:p>
             <a:fld id="{699DC775-C286-4358-8C92-D7E584E969B3}" type="datetimeFigureOut">
               <a:rPr lang="en-US" smtClean="0"/>
-              <a:t>3/14/2017</a:t>
+              <a:t>5/11/2017</a:t>
             </a:fld>
             <a:endParaRPr lang="en-US"/>
           </a:p>
@@ -6876,7 +6876,7 @@
           <a:p>
             <a:fld id="{699DC775-C286-4358-8C92-D7E584E969B3}" type="datetimeFigureOut">
               <a:rPr lang="en-US" smtClean="0"/>
-              <a:t>3/14/2017</a:t>
+              <a:t>5/11/2017</a:t>
             </a:fld>
             <a:endParaRPr lang="en-US"/>
           </a:p>
@@ -7295,7 +7295,7 @@
           <a:p>
             <a:fld id="{699DC775-C286-4358-8C92-D7E584E969B3}" type="datetimeFigureOut">
               <a:rPr lang="en-US" smtClean="0"/>
-              <a:t>3/14/2017</a:t>
+              <a:t>5/11/2017</a:t>
             </a:fld>
             <a:endParaRPr lang="en-US"/>
           </a:p>
@@ -7412,7 +7412,7 @@
           <a:p>
             <a:fld id="{699DC775-C286-4358-8C92-D7E584E969B3}" type="datetimeFigureOut">
               <a:rPr lang="en-US" smtClean="0"/>
-              <a:t>3/14/2017</a:t>
+              <a:t>5/11/2017</a:t>
             </a:fld>
             <a:endParaRPr lang="en-US"/>
           </a:p>
@@ -7507,7 +7507,7 @@
           <a:p>
             <a:fld id="{699DC775-C286-4358-8C92-D7E584E969B3}" type="datetimeFigureOut">
               <a:rPr lang="en-US" smtClean="0"/>
-              <a:t>3/14/2017</a:t>
+              <a:t>5/11/2017</a:t>
             </a:fld>
             <a:endParaRPr lang="en-US"/>
           </a:p>
@@ -7782,7 +7782,7 @@
           <a:p>
             <a:fld id="{699DC775-C286-4358-8C92-D7E584E969B3}" type="datetimeFigureOut">
               <a:rPr lang="en-US" smtClean="0"/>
-              <a:t>3/14/2017</a:t>
+              <a:t>5/11/2017</a:t>
             </a:fld>
             <a:endParaRPr lang="en-US"/>
           </a:p>
@@ -8034,7 +8034,7 @@
           <a:p>
             <a:fld id="{699DC775-C286-4358-8C92-D7E584E969B3}" type="datetimeFigureOut">
               <a:rPr lang="en-US" smtClean="0"/>
-              <a:t>3/14/2017</a:t>
+              <a:t>5/11/2017</a:t>
             </a:fld>
             <a:endParaRPr lang="en-US"/>
           </a:p>
@@ -8245,7 +8245,7 @@
           <a:p>
             <a:fld id="{699DC775-C286-4358-8C92-D7E584E969B3}" type="datetimeFigureOut">
               <a:rPr lang="en-US" smtClean="0"/>
-              <a:t>3/14/2017</a:t>
+              <a:t>5/11/2017</a:t>
             </a:fld>
             <a:endParaRPr lang="en-US"/>
           </a:p>
@@ -8758,7 +8758,7 @@
           <a:p>
             <a:fld id="{699DC775-C286-4358-8C92-D7E584E969B3}" type="datetimeFigureOut">
               <a:rPr lang="en-US" smtClean="0"/>
-              <a:t>3/14/2017</a:t>
+              <a:t>5/11/2017</a:t>
             </a:fld>
             <a:endParaRPr lang="en-US"/>
           </a:p>
@@ -9269,7 +9269,7 @@
           <a:p>
             <a:fld id="{699DC775-C286-4358-8C92-D7E584E969B3}" type="datetimeFigureOut">
               <a:rPr lang="en-US" smtClean="0"/>
-              <a:t>3/14/2017</a:t>
+              <a:t>5/11/2017</a:t>
             </a:fld>
             <a:endParaRPr lang="en-US"/>
           </a:p>
@@ -9848,47 +9848,9 @@
           <a:chExt cx="0" cy="0"/>
         </a:xfrm>
       </p:grpSpPr>
-      <p:sp>
-        <p:nvSpPr>
-          <p:cNvPr id="4" name="text 3"/>
-          <p:cNvSpPr txBox="1"/>
-          <p:nvPr/>
-        </p:nvSpPr>
-        <p:spPr>
-          <a:xfrm>
-            <a:off x="3365631" y="6019800"/>
-            <a:ext cx="2693814" cy="523220"/>
-          </a:xfrm>
-          <a:prstGeom prst="rect">
-            <a:avLst/>
-          </a:prstGeom>
-          <a:noFill/>
-        </p:spPr>
-        <p:txBody>
-          <a:bodyPr wrap="none" rtlCol="0">
-            <a:spAutoFit/>
-          </a:bodyPr>
-          <a:lstStyle/>
-          <a:p>
-            <a:r>
-              <a:rPr lang="en-US" sz="2800" b="1" dirty="0">
-                <a:solidFill>
-                  <a:schemeClr val="accent1"/>
-                </a:solidFill>
-              </a:rPr>
-              <a:t>Expected Output</a:t>
-            </a:r>
-            <a:endParaRPr lang="en-SG" sz="2800" b="1" dirty="0">
-              <a:solidFill>
-                <a:schemeClr val="accent1"/>
-              </a:solidFill>
-            </a:endParaRPr>
-          </a:p>
-        </p:txBody>
-      </p:sp>
       <p:pic>
         <p:nvPicPr>
-          <p:cNvPr id="5" name="selectMe"/>
+          <p:cNvPr id="7" name="selectMe"/>
           <p:cNvPicPr>
             <a:picLocks noChangeAspect="1"/>
           </p:cNvPicPr>
@@ -9917,10 +9879,48 @@
           </a:prstGeom>
         </p:spPr>
       </p:pic>
+      <p:sp>
+        <p:nvSpPr>
+          <p:cNvPr id="4" name="text 3"/>
+          <p:cNvSpPr txBox="1"/>
+          <p:nvPr/>
+        </p:nvSpPr>
+        <p:spPr>
+          <a:xfrm>
+            <a:off x="3365631" y="6019800"/>
+            <a:ext cx="2693814" cy="523220"/>
+          </a:xfrm>
+          <a:prstGeom prst="rect">
+            <a:avLst/>
+          </a:prstGeom>
+          <a:noFill/>
+        </p:spPr>
+        <p:txBody>
+          <a:bodyPr wrap="none" rtlCol="0">
+            <a:spAutoFit/>
+          </a:bodyPr>
+          <a:lstStyle/>
+          <a:p>
+            <a:r>
+              <a:rPr lang="en-US" sz="2800" b="1" dirty="0">
+                <a:solidFill>
+                  <a:schemeClr val="accent1"/>
+                </a:solidFill>
+              </a:rPr>
+              <a:t>Expected Output</a:t>
+            </a:r>
+            <a:endParaRPr lang="en-SG" sz="2800" b="1" dirty="0">
+              <a:solidFill>
+                <a:schemeClr val="accent1"/>
+              </a:solidFill>
+            </a:endParaRPr>
+          </a:p>
+        </p:txBody>
+      </p:sp>
     </p:spTree>
     <p:extLst>
       <p:ext uri="{BB962C8B-B14F-4D97-AF65-F5344CB8AC3E}">
-        <p14:creationId xmlns:p14="http://schemas.microsoft.com/office/powerpoint/2010/main" val="2461596904"/>
+        <p14:creationId xmlns:p14="http://schemas.microsoft.com/office/powerpoint/2010/main" val="2088050965"/>
       </p:ext>
     </p:extLst>
   </p:cSld>
@@ -10005,6 +10005,14 @@
   <p:clrMapOvr>
     <a:masterClrMapping/>
   </p:clrMapOvr>
+  <mc:AlternateContent xmlns:mc="http://schemas.openxmlformats.org/markup-compatibility/2006" xmlns:p14="http://schemas.microsoft.com/office/powerpoint/2010/main">
+    <mc:Choice Requires="p14">
+      <p:transition spd="slow" p14:dur="2000"/>
+    </mc:Choice>
+    <mc:Fallback xmlns="">
+      <p:transition spd="slow"/>
+    </mc:Fallback>
+  </mc:AlternateContent>
 </p:sld>
 </file>
 
@@ -10375,47 +10383,9 @@
           <a:chExt cx="0" cy="0"/>
         </a:xfrm>
       </p:grpSpPr>
-      <p:sp>
-        <p:nvSpPr>
-          <p:cNvPr id="4" name="text 3"/>
-          <p:cNvSpPr txBox="1"/>
-          <p:nvPr/>
-        </p:nvSpPr>
-        <p:spPr>
-          <a:xfrm>
-            <a:off x="3365631" y="6019800"/>
-            <a:ext cx="2693814" cy="523220"/>
-          </a:xfrm>
-          <a:prstGeom prst="rect">
-            <a:avLst/>
-          </a:prstGeom>
-          <a:noFill/>
-        </p:spPr>
-        <p:txBody>
-          <a:bodyPr wrap="none" rtlCol="0">
-            <a:spAutoFit/>
-          </a:bodyPr>
-          <a:lstStyle/>
-          <a:p>
-            <a:r>
-              <a:rPr lang="en-US" sz="2800" b="1" dirty="0">
-                <a:solidFill>
-                  <a:schemeClr val="accent1"/>
-                </a:solidFill>
-              </a:rPr>
-              <a:t>Expected Output</a:t>
-            </a:r>
-            <a:endParaRPr lang="en-SG" sz="2800" b="1" dirty="0">
-              <a:solidFill>
-                <a:schemeClr val="accent1"/>
-              </a:solidFill>
-            </a:endParaRPr>
-          </a:p>
-        </p:txBody>
-      </p:sp>
       <p:pic>
         <p:nvPicPr>
-          <p:cNvPr id="7" name="selectMe"/>
+          <p:cNvPr id="5" name="selectMe"/>
           <p:cNvPicPr>
             <a:picLocks noChangeAspect="1"/>
           </p:cNvPicPr>
@@ -10444,10 +10414,48 @@
           </a:prstGeom>
         </p:spPr>
       </p:pic>
+      <p:sp>
+        <p:nvSpPr>
+          <p:cNvPr id="4" name="text 3"/>
+          <p:cNvSpPr txBox="1"/>
+          <p:nvPr/>
+        </p:nvSpPr>
+        <p:spPr>
+          <a:xfrm>
+            <a:off x="3365631" y="6019800"/>
+            <a:ext cx="2693814" cy="523220"/>
+          </a:xfrm>
+          <a:prstGeom prst="rect">
+            <a:avLst/>
+          </a:prstGeom>
+          <a:noFill/>
+        </p:spPr>
+        <p:txBody>
+          <a:bodyPr wrap="none" rtlCol="0">
+            <a:spAutoFit/>
+          </a:bodyPr>
+          <a:lstStyle/>
+          <a:p>
+            <a:r>
+              <a:rPr lang="en-US" sz="2800" b="1" dirty="0">
+                <a:solidFill>
+                  <a:schemeClr val="accent1"/>
+                </a:solidFill>
+              </a:rPr>
+              <a:t>Expected Output</a:t>
+            </a:r>
+            <a:endParaRPr lang="en-SG" sz="2800" b="1" dirty="0">
+              <a:solidFill>
+                <a:schemeClr val="accent1"/>
+              </a:solidFill>
+            </a:endParaRPr>
+          </a:p>
+        </p:txBody>
+      </p:sp>
     </p:spTree>
     <p:extLst>
       <p:ext uri="{BB962C8B-B14F-4D97-AF65-F5344CB8AC3E}">
-        <p14:creationId xmlns:p14="http://schemas.microsoft.com/office/powerpoint/2010/main" val="2956304688"/>
+        <p14:creationId xmlns:p14="http://schemas.microsoft.com/office/powerpoint/2010/main" val="2159002665"/>
       </p:ext>
     </p:extLst>
   </p:cSld>
@@ -10671,47 +10679,9 @@
           <a:chExt cx="0" cy="0"/>
         </a:xfrm>
       </p:grpSpPr>
-      <p:sp>
-        <p:nvSpPr>
-          <p:cNvPr id="6" name="text 3"/>
-          <p:cNvSpPr txBox="1"/>
-          <p:nvPr/>
-        </p:nvSpPr>
-        <p:spPr>
-          <a:xfrm>
-            <a:off x="3365631" y="6019800"/>
-            <a:ext cx="2693814" cy="523220"/>
-          </a:xfrm>
-          <a:prstGeom prst="rect">
-            <a:avLst/>
-          </a:prstGeom>
-          <a:noFill/>
-        </p:spPr>
-        <p:txBody>
-          <a:bodyPr wrap="none" rtlCol="0">
-            <a:spAutoFit/>
-          </a:bodyPr>
-          <a:lstStyle/>
-          <a:p>
-            <a:r>
-              <a:rPr lang="en-US" sz="2800" b="1" dirty="0">
-                <a:solidFill>
-                  <a:schemeClr val="accent1"/>
-                </a:solidFill>
-              </a:rPr>
-              <a:t>Expected Output</a:t>
-            </a:r>
-            <a:endParaRPr lang="en-SG" sz="2800" b="1" dirty="0">
-              <a:solidFill>
-                <a:schemeClr val="accent1"/>
-              </a:solidFill>
-            </a:endParaRPr>
-          </a:p>
-        </p:txBody>
-      </p:sp>
       <p:pic>
         <p:nvPicPr>
-          <p:cNvPr id="5" name="selectMe2"/>
+          <p:cNvPr id="13" name="selectMe2"/>
           <p:cNvPicPr>
             <a:picLocks noChangeAspect="1"/>
           </p:cNvPicPr>
@@ -10742,7 +10712,7 @@
       </p:pic>
       <p:pic>
         <p:nvPicPr>
-          <p:cNvPr id="7" name="selectMe1"/>
+          <p:cNvPr id="14" name="selectMe1"/>
           <p:cNvPicPr>
             <a:picLocks noChangeAspect="1"/>
           </p:cNvPicPr>
@@ -10771,10 +10741,48 @@
           </a:prstGeom>
         </p:spPr>
       </p:pic>
+      <p:sp>
+        <p:nvSpPr>
+          <p:cNvPr id="6" name="text 3"/>
+          <p:cNvSpPr txBox="1"/>
+          <p:nvPr/>
+        </p:nvSpPr>
+        <p:spPr>
+          <a:xfrm>
+            <a:off x="3365631" y="6019800"/>
+            <a:ext cx="2693814" cy="523220"/>
+          </a:xfrm>
+          <a:prstGeom prst="rect">
+            <a:avLst/>
+          </a:prstGeom>
+          <a:noFill/>
+        </p:spPr>
+        <p:txBody>
+          <a:bodyPr wrap="none" rtlCol="0">
+            <a:spAutoFit/>
+          </a:bodyPr>
+          <a:lstStyle/>
+          <a:p>
+            <a:r>
+              <a:rPr lang="en-US" sz="2800" b="1" dirty="0">
+                <a:solidFill>
+                  <a:schemeClr val="accent1"/>
+                </a:solidFill>
+              </a:rPr>
+              <a:t>Expected Output</a:t>
+            </a:r>
+            <a:endParaRPr lang="en-SG" sz="2800" b="1" dirty="0">
+              <a:solidFill>
+                <a:schemeClr val="accent1"/>
+              </a:solidFill>
+            </a:endParaRPr>
+          </a:p>
+        </p:txBody>
+      </p:sp>
     </p:spTree>
     <p:extLst>
       <p:ext uri="{BB962C8B-B14F-4D97-AF65-F5344CB8AC3E}">
-        <p14:creationId xmlns:p14="http://schemas.microsoft.com/office/powerpoint/2010/main" val="3336211021"/>
+        <p14:creationId xmlns:p14="http://schemas.microsoft.com/office/powerpoint/2010/main" val="2399264061"/>
       </p:ext>
     </p:extLst>
   </p:cSld>

</xml_diff>

<commit_message>
Preserve object order when swapping #1302 (#1333)
* Preserve object order when swapping

* Fix logic bug with swapping zOrder

* Use SwapZOrder instead of UpdateZOrder

* Overhaul tests to test for z ordering

* Fix tests that broke due to addition of z order check

* Change the tests to check z order only for positions lab swap

* Wrap Shapes in PPShape and use PPShape SwapZOrder
</commit_message>
<xml_diff>
--- a/doc/test/CropOutPadding.pptx
+++ b/doc/test/CropOutPadding.pptx
@@ -14,13 +14,13 @@
     <p:sldId id="256" r:id="rId5"/>
     <p:sldId id="292" r:id="rId6"/>
     <p:sldId id="293" r:id="rId7"/>
-    <p:sldId id="308" r:id="rId8"/>
+    <p:sldId id="312" r:id="rId8"/>
     <p:sldId id="296" r:id="rId9"/>
     <p:sldId id="301" r:id="rId10"/>
-    <p:sldId id="309" r:id="rId11"/>
+    <p:sldId id="311" r:id="rId11"/>
     <p:sldId id="305" r:id="rId12"/>
     <p:sldId id="306" r:id="rId13"/>
-    <p:sldId id="310" r:id="rId14"/>
+    <p:sldId id="313" r:id="rId14"/>
     <p:sldId id="274" r:id="rId15"/>
   </p:sldIdLst>
   <p:sldSz cx="9144000" cy="6858000" type="screen4x3"/>
@@ -133,13 +133,13 @@
             <p14:sldId id="256"/>
             <p14:sldId id="292"/>
             <p14:sldId id="293"/>
-            <p14:sldId id="308"/>
+            <p14:sldId id="312"/>
             <p14:sldId id="296"/>
             <p14:sldId id="301"/>
-            <p14:sldId id="309"/>
+            <p14:sldId id="311"/>
             <p14:sldId id="305"/>
             <p14:sldId id="306"/>
-            <p14:sldId id="310"/>
+            <p14:sldId id="313"/>
             <p14:sldId id="274"/>
           </p14:sldIdLst>
         </p14:section>
@@ -245,7 +245,7 @@
           <a:p>
             <a:fld id="{26004F41-C1A1-4B0D-9EEE-5E3F0E5BC108}" type="datetimeFigureOut">
               <a:rPr lang="en-SG" smtClean="0"/>
-              <a:t>14/3/2017</a:t>
+              <a:t>11/5/2017</a:t>
             </a:fld>
             <a:endParaRPr lang="en-SG"/>
           </a:p>
@@ -671,7 +671,7 @@
     </p:spTree>
     <p:extLst>
       <p:ext uri="{BB962C8B-B14F-4D97-AF65-F5344CB8AC3E}">
-        <p14:creationId xmlns:p14="http://schemas.microsoft.com/office/powerpoint/2010/main" val="880112976"/>
+        <p14:creationId xmlns:p14="http://schemas.microsoft.com/office/powerpoint/2010/main" val="1425387705"/>
       </p:ext>
     </p:extLst>
   </p:cSld>
@@ -860,7 +860,7 @@
           <a:p>
             <a:fld id="{699DC775-C286-4358-8C92-D7E584E969B3}" type="datetimeFigureOut">
               <a:rPr lang="en-US" smtClean="0"/>
-              <a:t>3/14/2017</a:t>
+              <a:t>5/11/2017</a:t>
             </a:fld>
             <a:endParaRPr lang="en-US"/>
           </a:p>
@@ -1028,7 +1028,7 @@
           <a:p>
             <a:fld id="{699DC775-C286-4358-8C92-D7E584E969B3}" type="datetimeFigureOut">
               <a:rPr lang="en-US" smtClean="0"/>
-              <a:t>3/14/2017</a:t>
+              <a:t>5/11/2017</a:t>
             </a:fld>
             <a:endParaRPr lang="en-US"/>
           </a:p>
@@ -1206,7 +1206,7 @@
           <a:p>
             <a:fld id="{699DC775-C286-4358-8C92-D7E584E969B3}" type="datetimeFigureOut">
               <a:rPr lang="en-US" smtClean="0"/>
-              <a:t>3/14/2017</a:t>
+              <a:t>5/11/2017</a:t>
             </a:fld>
             <a:endParaRPr lang="en-US"/>
           </a:p>
@@ -1446,7 +1446,7 @@
           <a:p>
             <a:fld id="{699DC775-C286-4358-8C92-D7E584E969B3}" type="datetimeFigureOut">
               <a:rPr lang="en-US" smtClean="0"/>
-              <a:t>3/14/2017</a:t>
+              <a:t>5/11/2017</a:t>
             </a:fld>
             <a:endParaRPr lang="en-US"/>
           </a:p>
@@ -1614,7 +1614,7 @@
           <a:p>
             <a:fld id="{699DC775-C286-4358-8C92-D7E584E969B3}" type="datetimeFigureOut">
               <a:rPr lang="en-US" smtClean="0"/>
-              <a:t>3/14/2017</a:t>
+              <a:t>5/11/2017</a:t>
             </a:fld>
             <a:endParaRPr lang="en-US"/>
           </a:p>
@@ -1859,7 +1859,7 @@
           <a:p>
             <a:fld id="{699DC775-C286-4358-8C92-D7E584E969B3}" type="datetimeFigureOut">
               <a:rPr lang="en-US" smtClean="0"/>
-              <a:t>3/14/2017</a:t>
+              <a:t>5/11/2017</a:t>
             </a:fld>
             <a:endParaRPr lang="en-US"/>
           </a:p>
@@ -2144,7 +2144,7 @@
           <a:p>
             <a:fld id="{699DC775-C286-4358-8C92-D7E584E969B3}" type="datetimeFigureOut">
               <a:rPr lang="en-US" smtClean="0"/>
-              <a:t>3/14/2017</a:t>
+              <a:t>5/11/2017</a:t>
             </a:fld>
             <a:endParaRPr lang="en-US"/>
           </a:p>
@@ -2563,7 +2563,7 @@
           <a:p>
             <a:fld id="{699DC775-C286-4358-8C92-D7E584E969B3}" type="datetimeFigureOut">
               <a:rPr lang="en-US" smtClean="0"/>
-              <a:t>3/14/2017</a:t>
+              <a:t>5/11/2017</a:t>
             </a:fld>
             <a:endParaRPr lang="en-US"/>
           </a:p>
@@ -2680,7 +2680,7 @@
           <a:p>
             <a:fld id="{699DC775-C286-4358-8C92-D7E584E969B3}" type="datetimeFigureOut">
               <a:rPr lang="en-US" smtClean="0"/>
-              <a:t>3/14/2017</a:t>
+              <a:t>5/11/2017</a:t>
             </a:fld>
             <a:endParaRPr lang="en-US"/>
           </a:p>
@@ -2775,7 +2775,7 @@
           <a:p>
             <a:fld id="{699DC775-C286-4358-8C92-D7E584E969B3}" type="datetimeFigureOut">
               <a:rPr lang="en-US" smtClean="0"/>
-              <a:t>3/14/2017</a:t>
+              <a:t>5/11/2017</a:t>
             </a:fld>
             <a:endParaRPr lang="en-US"/>
           </a:p>
@@ -3050,7 +3050,7 @@
           <a:p>
             <a:fld id="{699DC775-C286-4358-8C92-D7E584E969B3}" type="datetimeFigureOut">
               <a:rPr lang="en-US" smtClean="0"/>
-              <a:t>3/14/2017</a:t>
+              <a:t>5/11/2017</a:t>
             </a:fld>
             <a:endParaRPr lang="en-US"/>
           </a:p>
@@ -3218,7 +3218,7 @@
           <a:p>
             <a:fld id="{699DC775-C286-4358-8C92-D7E584E969B3}" type="datetimeFigureOut">
               <a:rPr lang="en-US" smtClean="0"/>
-              <a:t>3/14/2017</a:t>
+              <a:t>5/11/2017</a:t>
             </a:fld>
             <a:endParaRPr lang="en-US"/>
           </a:p>
@@ -3470,7 +3470,7 @@
           <a:p>
             <a:fld id="{699DC775-C286-4358-8C92-D7E584E969B3}" type="datetimeFigureOut">
               <a:rPr lang="en-US" smtClean="0"/>
-              <a:t>3/14/2017</a:t>
+              <a:t>5/11/2017</a:t>
             </a:fld>
             <a:endParaRPr lang="en-US"/>
           </a:p>
@@ -3638,7 +3638,7 @@
           <a:p>
             <a:fld id="{699DC775-C286-4358-8C92-D7E584E969B3}" type="datetimeFigureOut">
               <a:rPr lang="en-US" smtClean="0"/>
-              <a:t>3/14/2017</a:t>
+              <a:t>5/11/2017</a:t>
             </a:fld>
             <a:endParaRPr lang="en-US"/>
           </a:p>
@@ -3816,7 +3816,7 @@
           <a:p>
             <a:fld id="{699DC775-C286-4358-8C92-D7E584E969B3}" type="datetimeFigureOut">
               <a:rPr lang="en-US" smtClean="0"/>
-              <a:t>3/14/2017</a:t>
+              <a:t>5/11/2017</a:t>
             </a:fld>
             <a:endParaRPr lang="en-US"/>
           </a:p>
@@ -4064,7 +4064,7 @@
           <a:p>
             <a:fld id="{699DC775-C286-4358-8C92-D7E584E969B3}" type="datetimeFigureOut">
               <a:rPr lang="en-US" smtClean="0"/>
-              <a:t>3/14/2017</a:t>
+              <a:t>5/11/2017</a:t>
             </a:fld>
             <a:endParaRPr lang="en-US"/>
           </a:p>
@@ -4240,7 +4240,7 @@
           <a:p>
             <a:fld id="{699DC775-C286-4358-8C92-D7E584E969B3}" type="datetimeFigureOut">
               <a:rPr lang="en-US" smtClean="0"/>
-              <a:t>3/14/2017</a:t>
+              <a:t>5/11/2017</a:t>
             </a:fld>
             <a:endParaRPr lang="en-US"/>
           </a:p>
@@ -4493,7 +4493,7 @@
           <a:p>
             <a:fld id="{699DC775-C286-4358-8C92-D7E584E969B3}" type="datetimeFigureOut">
               <a:rPr lang="en-US" smtClean="0"/>
-              <a:t>3/14/2017</a:t>
+              <a:t>5/11/2017</a:t>
             </a:fld>
             <a:endParaRPr lang="en-US"/>
           </a:p>
@@ -4786,7 +4786,7 @@
           <a:p>
             <a:fld id="{699DC775-C286-4358-8C92-D7E584E969B3}" type="datetimeFigureOut">
               <a:rPr lang="en-US" smtClean="0"/>
-              <a:t>3/14/2017</a:t>
+              <a:t>5/11/2017</a:t>
             </a:fld>
             <a:endParaRPr lang="en-US"/>
           </a:p>
@@ -5213,7 +5213,7 @@
           <a:p>
             <a:fld id="{699DC775-C286-4358-8C92-D7E584E969B3}" type="datetimeFigureOut">
               <a:rPr lang="en-US" smtClean="0"/>
-              <a:t>3/14/2017</a:t>
+              <a:t>5/11/2017</a:t>
             </a:fld>
             <a:endParaRPr lang="en-US"/>
           </a:p>
@@ -5338,7 +5338,7 @@
           <a:p>
             <a:fld id="{699DC775-C286-4358-8C92-D7E584E969B3}" type="datetimeFigureOut">
               <a:rPr lang="en-US" smtClean="0"/>
-              <a:t>3/14/2017</a:t>
+              <a:t>5/11/2017</a:t>
             </a:fld>
             <a:endParaRPr lang="en-US"/>
           </a:p>
@@ -5441,7 +5441,7 @@
           <a:p>
             <a:fld id="{699DC775-C286-4358-8C92-D7E584E969B3}" type="datetimeFigureOut">
               <a:rPr lang="en-US" smtClean="0"/>
-              <a:t>3/14/2017</a:t>
+              <a:t>5/11/2017</a:t>
             </a:fld>
             <a:endParaRPr lang="en-US"/>
           </a:p>
@@ -5686,7 +5686,7 @@
           <a:p>
             <a:fld id="{699DC775-C286-4358-8C92-D7E584E969B3}" type="datetimeFigureOut">
               <a:rPr lang="en-US" smtClean="0"/>
-              <a:t>3/14/2017</a:t>
+              <a:t>5/11/2017</a:t>
             </a:fld>
             <a:endParaRPr lang="en-US"/>
           </a:p>
@@ -5969,7 +5969,7 @@
           <a:p>
             <a:fld id="{699DC775-C286-4358-8C92-D7E584E969B3}" type="datetimeFigureOut">
               <a:rPr lang="en-US" smtClean="0"/>
-              <a:t>3/14/2017</a:t>
+              <a:t>5/11/2017</a:t>
             </a:fld>
             <a:endParaRPr lang="en-US"/>
           </a:p>
@@ -6229,7 +6229,7 @@
           <a:p>
             <a:fld id="{699DC775-C286-4358-8C92-D7E584E969B3}" type="datetimeFigureOut">
               <a:rPr lang="en-US" smtClean="0"/>
-              <a:t>3/14/2017</a:t>
+              <a:t>5/11/2017</a:t>
             </a:fld>
             <a:endParaRPr lang="en-US"/>
           </a:p>
@@ -6405,7 +6405,7 @@
           <a:p>
             <a:fld id="{699DC775-C286-4358-8C92-D7E584E969B3}" type="datetimeFigureOut">
               <a:rPr lang="en-US" smtClean="0"/>
-              <a:t>3/14/2017</a:t>
+              <a:t>5/11/2017</a:t>
             </a:fld>
             <a:endParaRPr lang="en-US"/>
           </a:p>
@@ -6591,7 +6591,7 @@
           <a:p>
             <a:fld id="{699DC775-C286-4358-8C92-D7E584E969B3}" type="datetimeFigureOut">
               <a:rPr lang="en-US" smtClean="0"/>
-              <a:t>3/14/2017</a:t>
+              <a:t>5/11/2017</a:t>
             </a:fld>
             <a:endParaRPr lang="en-US"/>
           </a:p>
@@ -6876,7 +6876,7 @@
           <a:p>
             <a:fld id="{699DC775-C286-4358-8C92-D7E584E969B3}" type="datetimeFigureOut">
               <a:rPr lang="en-US" smtClean="0"/>
-              <a:t>3/14/2017</a:t>
+              <a:t>5/11/2017</a:t>
             </a:fld>
             <a:endParaRPr lang="en-US"/>
           </a:p>
@@ -7295,7 +7295,7 @@
           <a:p>
             <a:fld id="{699DC775-C286-4358-8C92-D7E584E969B3}" type="datetimeFigureOut">
               <a:rPr lang="en-US" smtClean="0"/>
-              <a:t>3/14/2017</a:t>
+              <a:t>5/11/2017</a:t>
             </a:fld>
             <a:endParaRPr lang="en-US"/>
           </a:p>
@@ -7412,7 +7412,7 @@
           <a:p>
             <a:fld id="{699DC775-C286-4358-8C92-D7E584E969B3}" type="datetimeFigureOut">
               <a:rPr lang="en-US" smtClean="0"/>
-              <a:t>3/14/2017</a:t>
+              <a:t>5/11/2017</a:t>
             </a:fld>
             <a:endParaRPr lang="en-US"/>
           </a:p>
@@ -7507,7 +7507,7 @@
           <a:p>
             <a:fld id="{699DC775-C286-4358-8C92-D7E584E969B3}" type="datetimeFigureOut">
               <a:rPr lang="en-US" smtClean="0"/>
-              <a:t>3/14/2017</a:t>
+              <a:t>5/11/2017</a:t>
             </a:fld>
             <a:endParaRPr lang="en-US"/>
           </a:p>
@@ -7782,7 +7782,7 @@
           <a:p>
             <a:fld id="{699DC775-C286-4358-8C92-D7E584E969B3}" type="datetimeFigureOut">
               <a:rPr lang="en-US" smtClean="0"/>
-              <a:t>3/14/2017</a:t>
+              <a:t>5/11/2017</a:t>
             </a:fld>
             <a:endParaRPr lang="en-US"/>
           </a:p>
@@ -8034,7 +8034,7 @@
           <a:p>
             <a:fld id="{699DC775-C286-4358-8C92-D7E584E969B3}" type="datetimeFigureOut">
               <a:rPr lang="en-US" smtClean="0"/>
-              <a:t>3/14/2017</a:t>
+              <a:t>5/11/2017</a:t>
             </a:fld>
             <a:endParaRPr lang="en-US"/>
           </a:p>
@@ -8245,7 +8245,7 @@
           <a:p>
             <a:fld id="{699DC775-C286-4358-8C92-D7E584E969B3}" type="datetimeFigureOut">
               <a:rPr lang="en-US" smtClean="0"/>
-              <a:t>3/14/2017</a:t>
+              <a:t>5/11/2017</a:t>
             </a:fld>
             <a:endParaRPr lang="en-US"/>
           </a:p>
@@ -8758,7 +8758,7 @@
           <a:p>
             <a:fld id="{699DC775-C286-4358-8C92-D7E584E969B3}" type="datetimeFigureOut">
               <a:rPr lang="en-US" smtClean="0"/>
-              <a:t>3/14/2017</a:t>
+              <a:t>5/11/2017</a:t>
             </a:fld>
             <a:endParaRPr lang="en-US"/>
           </a:p>
@@ -9269,7 +9269,7 @@
           <a:p>
             <a:fld id="{699DC775-C286-4358-8C92-D7E584E969B3}" type="datetimeFigureOut">
               <a:rPr lang="en-US" smtClean="0"/>
-              <a:t>3/14/2017</a:t>
+              <a:t>5/11/2017</a:t>
             </a:fld>
             <a:endParaRPr lang="en-US"/>
           </a:p>
@@ -9848,47 +9848,9 @@
           <a:chExt cx="0" cy="0"/>
         </a:xfrm>
       </p:grpSpPr>
-      <p:sp>
-        <p:nvSpPr>
-          <p:cNvPr id="4" name="text 3"/>
-          <p:cNvSpPr txBox="1"/>
-          <p:nvPr/>
-        </p:nvSpPr>
-        <p:spPr>
-          <a:xfrm>
-            <a:off x="3365631" y="6019800"/>
-            <a:ext cx="2693814" cy="523220"/>
-          </a:xfrm>
-          <a:prstGeom prst="rect">
-            <a:avLst/>
-          </a:prstGeom>
-          <a:noFill/>
-        </p:spPr>
-        <p:txBody>
-          <a:bodyPr wrap="none" rtlCol="0">
-            <a:spAutoFit/>
-          </a:bodyPr>
-          <a:lstStyle/>
-          <a:p>
-            <a:r>
-              <a:rPr lang="en-US" sz="2800" b="1" dirty="0">
-                <a:solidFill>
-                  <a:schemeClr val="accent1"/>
-                </a:solidFill>
-              </a:rPr>
-              <a:t>Expected Output</a:t>
-            </a:r>
-            <a:endParaRPr lang="en-SG" sz="2800" b="1" dirty="0">
-              <a:solidFill>
-                <a:schemeClr val="accent1"/>
-              </a:solidFill>
-            </a:endParaRPr>
-          </a:p>
-        </p:txBody>
-      </p:sp>
       <p:pic>
         <p:nvPicPr>
-          <p:cNvPr id="5" name="selectMe"/>
+          <p:cNvPr id="7" name="selectMe"/>
           <p:cNvPicPr>
             <a:picLocks noChangeAspect="1"/>
           </p:cNvPicPr>
@@ -9917,10 +9879,48 @@
           </a:prstGeom>
         </p:spPr>
       </p:pic>
+      <p:sp>
+        <p:nvSpPr>
+          <p:cNvPr id="4" name="text 3"/>
+          <p:cNvSpPr txBox="1"/>
+          <p:nvPr/>
+        </p:nvSpPr>
+        <p:spPr>
+          <a:xfrm>
+            <a:off x="3365631" y="6019800"/>
+            <a:ext cx="2693814" cy="523220"/>
+          </a:xfrm>
+          <a:prstGeom prst="rect">
+            <a:avLst/>
+          </a:prstGeom>
+          <a:noFill/>
+        </p:spPr>
+        <p:txBody>
+          <a:bodyPr wrap="none" rtlCol="0">
+            <a:spAutoFit/>
+          </a:bodyPr>
+          <a:lstStyle/>
+          <a:p>
+            <a:r>
+              <a:rPr lang="en-US" sz="2800" b="1" dirty="0">
+                <a:solidFill>
+                  <a:schemeClr val="accent1"/>
+                </a:solidFill>
+              </a:rPr>
+              <a:t>Expected Output</a:t>
+            </a:r>
+            <a:endParaRPr lang="en-SG" sz="2800" b="1" dirty="0">
+              <a:solidFill>
+                <a:schemeClr val="accent1"/>
+              </a:solidFill>
+            </a:endParaRPr>
+          </a:p>
+        </p:txBody>
+      </p:sp>
     </p:spTree>
     <p:extLst>
       <p:ext uri="{BB962C8B-B14F-4D97-AF65-F5344CB8AC3E}">
-        <p14:creationId xmlns:p14="http://schemas.microsoft.com/office/powerpoint/2010/main" val="2461596904"/>
+        <p14:creationId xmlns:p14="http://schemas.microsoft.com/office/powerpoint/2010/main" val="2088050965"/>
       </p:ext>
     </p:extLst>
   </p:cSld>
@@ -10005,6 +10005,14 @@
   <p:clrMapOvr>
     <a:masterClrMapping/>
   </p:clrMapOvr>
+  <mc:AlternateContent xmlns:mc="http://schemas.openxmlformats.org/markup-compatibility/2006" xmlns:p14="http://schemas.microsoft.com/office/powerpoint/2010/main">
+    <mc:Choice Requires="p14">
+      <p:transition spd="slow" p14:dur="2000"/>
+    </mc:Choice>
+    <mc:Fallback xmlns="">
+      <p:transition spd="slow"/>
+    </mc:Fallback>
+  </mc:AlternateContent>
 </p:sld>
 </file>
 
@@ -10375,47 +10383,9 @@
           <a:chExt cx="0" cy="0"/>
         </a:xfrm>
       </p:grpSpPr>
-      <p:sp>
-        <p:nvSpPr>
-          <p:cNvPr id="4" name="text 3"/>
-          <p:cNvSpPr txBox="1"/>
-          <p:nvPr/>
-        </p:nvSpPr>
-        <p:spPr>
-          <a:xfrm>
-            <a:off x="3365631" y="6019800"/>
-            <a:ext cx="2693814" cy="523220"/>
-          </a:xfrm>
-          <a:prstGeom prst="rect">
-            <a:avLst/>
-          </a:prstGeom>
-          <a:noFill/>
-        </p:spPr>
-        <p:txBody>
-          <a:bodyPr wrap="none" rtlCol="0">
-            <a:spAutoFit/>
-          </a:bodyPr>
-          <a:lstStyle/>
-          <a:p>
-            <a:r>
-              <a:rPr lang="en-US" sz="2800" b="1" dirty="0">
-                <a:solidFill>
-                  <a:schemeClr val="accent1"/>
-                </a:solidFill>
-              </a:rPr>
-              <a:t>Expected Output</a:t>
-            </a:r>
-            <a:endParaRPr lang="en-SG" sz="2800" b="1" dirty="0">
-              <a:solidFill>
-                <a:schemeClr val="accent1"/>
-              </a:solidFill>
-            </a:endParaRPr>
-          </a:p>
-        </p:txBody>
-      </p:sp>
       <p:pic>
         <p:nvPicPr>
-          <p:cNvPr id="7" name="selectMe"/>
+          <p:cNvPr id="5" name="selectMe"/>
           <p:cNvPicPr>
             <a:picLocks noChangeAspect="1"/>
           </p:cNvPicPr>
@@ -10444,10 +10414,48 @@
           </a:prstGeom>
         </p:spPr>
       </p:pic>
+      <p:sp>
+        <p:nvSpPr>
+          <p:cNvPr id="4" name="text 3"/>
+          <p:cNvSpPr txBox="1"/>
+          <p:nvPr/>
+        </p:nvSpPr>
+        <p:spPr>
+          <a:xfrm>
+            <a:off x="3365631" y="6019800"/>
+            <a:ext cx="2693814" cy="523220"/>
+          </a:xfrm>
+          <a:prstGeom prst="rect">
+            <a:avLst/>
+          </a:prstGeom>
+          <a:noFill/>
+        </p:spPr>
+        <p:txBody>
+          <a:bodyPr wrap="none" rtlCol="0">
+            <a:spAutoFit/>
+          </a:bodyPr>
+          <a:lstStyle/>
+          <a:p>
+            <a:r>
+              <a:rPr lang="en-US" sz="2800" b="1" dirty="0">
+                <a:solidFill>
+                  <a:schemeClr val="accent1"/>
+                </a:solidFill>
+              </a:rPr>
+              <a:t>Expected Output</a:t>
+            </a:r>
+            <a:endParaRPr lang="en-SG" sz="2800" b="1" dirty="0">
+              <a:solidFill>
+                <a:schemeClr val="accent1"/>
+              </a:solidFill>
+            </a:endParaRPr>
+          </a:p>
+        </p:txBody>
+      </p:sp>
     </p:spTree>
     <p:extLst>
       <p:ext uri="{BB962C8B-B14F-4D97-AF65-F5344CB8AC3E}">
-        <p14:creationId xmlns:p14="http://schemas.microsoft.com/office/powerpoint/2010/main" val="2956304688"/>
+        <p14:creationId xmlns:p14="http://schemas.microsoft.com/office/powerpoint/2010/main" val="2159002665"/>
       </p:ext>
     </p:extLst>
   </p:cSld>
@@ -10671,47 +10679,9 @@
           <a:chExt cx="0" cy="0"/>
         </a:xfrm>
       </p:grpSpPr>
-      <p:sp>
-        <p:nvSpPr>
-          <p:cNvPr id="6" name="text 3"/>
-          <p:cNvSpPr txBox="1"/>
-          <p:nvPr/>
-        </p:nvSpPr>
-        <p:spPr>
-          <a:xfrm>
-            <a:off x="3365631" y="6019800"/>
-            <a:ext cx="2693814" cy="523220"/>
-          </a:xfrm>
-          <a:prstGeom prst="rect">
-            <a:avLst/>
-          </a:prstGeom>
-          <a:noFill/>
-        </p:spPr>
-        <p:txBody>
-          <a:bodyPr wrap="none" rtlCol="0">
-            <a:spAutoFit/>
-          </a:bodyPr>
-          <a:lstStyle/>
-          <a:p>
-            <a:r>
-              <a:rPr lang="en-US" sz="2800" b="1" dirty="0">
-                <a:solidFill>
-                  <a:schemeClr val="accent1"/>
-                </a:solidFill>
-              </a:rPr>
-              <a:t>Expected Output</a:t>
-            </a:r>
-            <a:endParaRPr lang="en-SG" sz="2800" b="1" dirty="0">
-              <a:solidFill>
-                <a:schemeClr val="accent1"/>
-              </a:solidFill>
-            </a:endParaRPr>
-          </a:p>
-        </p:txBody>
-      </p:sp>
       <p:pic>
         <p:nvPicPr>
-          <p:cNvPr id="5" name="selectMe2"/>
+          <p:cNvPr id="13" name="selectMe2"/>
           <p:cNvPicPr>
             <a:picLocks noChangeAspect="1"/>
           </p:cNvPicPr>
@@ -10742,7 +10712,7 @@
       </p:pic>
       <p:pic>
         <p:nvPicPr>
-          <p:cNvPr id="7" name="selectMe1"/>
+          <p:cNvPr id="14" name="selectMe1"/>
           <p:cNvPicPr>
             <a:picLocks noChangeAspect="1"/>
           </p:cNvPicPr>
@@ -10771,10 +10741,48 @@
           </a:prstGeom>
         </p:spPr>
       </p:pic>
+      <p:sp>
+        <p:nvSpPr>
+          <p:cNvPr id="6" name="text 3"/>
+          <p:cNvSpPr txBox="1"/>
+          <p:nvPr/>
+        </p:nvSpPr>
+        <p:spPr>
+          <a:xfrm>
+            <a:off x="3365631" y="6019800"/>
+            <a:ext cx="2693814" cy="523220"/>
+          </a:xfrm>
+          <a:prstGeom prst="rect">
+            <a:avLst/>
+          </a:prstGeom>
+          <a:noFill/>
+        </p:spPr>
+        <p:txBody>
+          <a:bodyPr wrap="none" rtlCol="0">
+            <a:spAutoFit/>
+          </a:bodyPr>
+          <a:lstStyle/>
+          <a:p>
+            <a:r>
+              <a:rPr lang="en-US" sz="2800" b="1" dirty="0">
+                <a:solidFill>
+                  <a:schemeClr val="accent1"/>
+                </a:solidFill>
+              </a:rPr>
+              <a:t>Expected Output</a:t>
+            </a:r>
+            <a:endParaRPr lang="en-SG" sz="2800" b="1" dirty="0">
+              <a:solidFill>
+                <a:schemeClr val="accent1"/>
+              </a:solidFill>
+            </a:endParaRPr>
+          </a:p>
+        </p:txBody>
+      </p:sp>
     </p:spTree>
     <p:extLst>
       <p:ext uri="{BB962C8B-B14F-4D97-AF65-F5344CB8AC3E}">
-        <p14:creationId xmlns:p14="http://schemas.microsoft.com/office/powerpoint/2010/main" val="3336211021"/>
+        <p14:creationId xmlns:p14="http://schemas.microsoft.com/office/powerpoint/2010/main" val="2399264061"/>
       </p:ext>
     </p:extLst>
   </p:cSld>

</xml_diff>